<commit_message>
new fig 5 runs
</commit_message>
<xml_diff>
--- a/Figure_Overview.pptx
+++ b/Figure_Overview.pptx
@@ -14,9 +14,10 @@
     <p:sldId id="272" r:id="rId8"/>
     <p:sldId id="275" r:id="rId9"/>
     <p:sldId id="278" r:id="rId10"/>
-    <p:sldId id="279" r:id="rId11"/>
-    <p:sldId id="276" r:id="rId12"/>
-    <p:sldId id="277" r:id="rId13"/>
+    <p:sldId id="280" r:id="rId11"/>
+    <p:sldId id="279" r:id="rId12"/>
+    <p:sldId id="276" r:id="rId13"/>
+    <p:sldId id="277" r:id="rId14"/>
   </p:sldIdLst>
   <p:sldSz cx="12192000" cy="6858000"/>
   <p:notesSz cx="6858000" cy="9144000"/>
@@ -9705,7 +9706,7 @@
           <a:p>
             <a:fld id="{701B5F52-0AED-4C15-A38B-FA5B006D1D86}" type="datetimeFigureOut">
               <a:rPr lang="en-US" smtClean="0"/>
-              <a:t>10/10/2017</a:t>
+              <a:t>10/21/2017</a:t>
             </a:fld>
             <a:endParaRPr lang="en-US"/>
           </a:p>
@@ -9903,7 +9904,7 @@
           <a:p>
             <a:fld id="{701B5F52-0AED-4C15-A38B-FA5B006D1D86}" type="datetimeFigureOut">
               <a:rPr lang="en-US" smtClean="0"/>
-              <a:t>10/10/2017</a:t>
+              <a:t>10/21/2017</a:t>
             </a:fld>
             <a:endParaRPr lang="en-US"/>
           </a:p>
@@ -10111,7 +10112,7 @@
           <a:p>
             <a:fld id="{701B5F52-0AED-4C15-A38B-FA5B006D1D86}" type="datetimeFigureOut">
               <a:rPr lang="en-US" smtClean="0"/>
-              <a:t>10/10/2017</a:t>
+              <a:t>10/21/2017</a:t>
             </a:fld>
             <a:endParaRPr lang="en-US"/>
           </a:p>
@@ -10309,7 +10310,7 @@
           <a:p>
             <a:fld id="{701B5F52-0AED-4C15-A38B-FA5B006D1D86}" type="datetimeFigureOut">
               <a:rPr lang="en-US" smtClean="0"/>
-              <a:t>10/10/2017</a:t>
+              <a:t>10/21/2017</a:t>
             </a:fld>
             <a:endParaRPr lang="en-US"/>
           </a:p>
@@ -10584,7 +10585,7 @@
           <a:p>
             <a:fld id="{701B5F52-0AED-4C15-A38B-FA5B006D1D86}" type="datetimeFigureOut">
               <a:rPr lang="en-US" smtClean="0"/>
-              <a:t>10/10/2017</a:t>
+              <a:t>10/21/2017</a:t>
             </a:fld>
             <a:endParaRPr lang="en-US"/>
           </a:p>
@@ -10849,7 +10850,7 @@
           <a:p>
             <a:fld id="{701B5F52-0AED-4C15-A38B-FA5B006D1D86}" type="datetimeFigureOut">
               <a:rPr lang="en-US" smtClean="0"/>
-              <a:t>10/10/2017</a:t>
+              <a:t>10/21/2017</a:t>
             </a:fld>
             <a:endParaRPr lang="en-US"/>
           </a:p>
@@ -11261,7 +11262,7 @@
           <a:p>
             <a:fld id="{701B5F52-0AED-4C15-A38B-FA5B006D1D86}" type="datetimeFigureOut">
               <a:rPr lang="en-US" smtClean="0"/>
-              <a:t>10/10/2017</a:t>
+              <a:t>10/21/2017</a:t>
             </a:fld>
             <a:endParaRPr lang="en-US"/>
           </a:p>
@@ -11402,7 +11403,7 @@
           <a:p>
             <a:fld id="{701B5F52-0AED-4C15-A38B-FA5B006D1D86}" type="datetimeFigureOut">
               <a:rPr lang="en-US" smtClean="0"/>
-              <a:t>10/10/2017</a:t>
+              <a:t>10/21/2017</a:t>
             </a:fld>
             <a:endParaRPr lang="en-US"/>
           </a:p>
@@ -11515,7 +11516,7 @@
           <a:p>
             <a:fld id="{701B5F52-0AED-4C15-A38B-FA5B006D1D86}" type="datetimeFigureOut">
               <a:rPr lang="en-US" smtClean="0"/>
-              <a:t>10/10/2017</a:t>
+              <a:t>10/21/2017</a:t>
             </a:fld>
             <a:endParaRPr lang="en-US"/>
           </a:p>
@@ -11826,7 +11827,7 @@
           <a:p>
             <a:fld id="{701B5F52-0AED-4C15-A38B-FA5B006D1D86}" type="datetimeFigureOut">
               <a:rPr lang="en-US" smtClean="0"/>
-              <a:t>10/10/2017</a:t>
+              <a:t>10/21/2017</a:t>
             </a:fld>
             <a:endParaRPr lang="en-US"/>
           </a:p>
@@ -12114,7 +12115,7 @@
           <a:p>
             <a:fld id="{701B5F52-0AED-4C15-A38B-FA5B006D1D86}" type="datetimeFigureOut">
               <a:rPr lang="en-US" smtClean="0"/>
-              <a:t>10/10/2017</a:t>
+              <a:t>10/21/2017</a:t>
             </a:fld>
             <a:endParaRPr lang="en-US"/>
           </a:p>
@@ -12355,7 +12356,7 @@
           <a:p>
             <a:fld id="{701B5F52-0AED-4C15-A38B-FA5B006D1D86}" type="datetimeFigureOut">
               <a:rPr lang="en-US" smtClean="0"/>
-              <a:t>10/10/2017</a:t>
+              <a:t>10/21/2017</a:t>
             </a:fld>
             <a:endParaRPr lang="en-US"/>
           </a:p>
@@ -13097,6 +13098,119 @@
           <a:chExt cx="0" cy="0"/>
         </a:xfrm>
       </p:grpSpPr>
+      <p:sp>
+        <p:nvSpPr>
+          <p:cNvPr id="3" name="Content Placeholder 2">
+            <a:extLst>
+              <a:ext uri="{FF2B5EF4-FFF2-40B4-BE49-F238E27FC236}">
+                <a16:creationId xmlns:a16="http://schemas.microsoft.com/office/drawing/2014/main" id="{0CADAE4C-6D55-4061-9893-6054AA467FC9}"/>
+              </a:ext>
+            </a:extLst>
+          </p:cNvPr>
+          <p:cNvSpPr>
+            <a:spLocks noGrp="1"/>
+          </p:cNvSpPr>
+          <p:nvPr>
+            <p:ph idx="1"/>
+          </p:nvPr>
+        </p:nvSpPr>
+        <p:spPr/>
+        <p:txBody>
+          <a:bodyPr/>
+          <a:lstStyle/>
+          <a:p>
+            <a:r>
+              <a:rPr lang="en-US" dirty="0"/>
+              <a:t>Main source of variation is initial proportion</a:t>
+            </a:r>
+          </a:p>
+          <a:p>
+            <a:r>
+              <a:rPr lang="en-US" dirty="0"/>
+              <a:t>Three parameters: initial proportion, number of cell types, difference in cell types</a:t>
+            </a:r>
+          </a:p>
+          <a:p>
+            <a:r>
+              <a:rPr lang="en-US" dirty="0"/>
+              <a:t>A – show variance with one type is small</a:t>
+            </a:r>
+          </a:p>
+          <a:p>
+            <a:r>
+              <a:rPr lang="en-US" dirty="0"/>
+              <a:t>B – show variance is large with two cell types and varying prop</a:t>
+            </a:r>
+          </a:p>
+          <a:p>
+            <a:r>
+              <a:rPr lang="en-US" dirty="0"/>
+              <a:t>C – show adding cell types does not increase this variance</a:t>
+            </a:r>
+          </a:p>
+          <a:p>
+            <a:r>
+              <a:rPr lang="en-US" dirty="0"/>
+              <a:t>D – show increasing variance with increase variance in prop</a:t>
+            </a:r>
+          </a:p>
+          <a:p>
+            <a:r>
+              <a:rPr lang="en-US" dirty="0"/>
+              <a:t>Each fig has 3 components: total over time, prop </a:t>
+            </a:r>
+            <a:r>
+              <a:rPr lang="en-US" dirty="0" err="1"/>
+              <a:t>dist</a:t>
+            </a:r>
+            <a:r>
+              <a:rPr lang="en-US" dirty="0"/>
+              <a:t>, total </a:t>
+            </a:r>
+            <a:r>
+              <a:rPr lang="en-US" dirty="0" err="1"/>
+              <a:t>dist</a:t>
+            </a:r>
+            <a:r>
+              <a:rPr lang="en-US" dirty="0"/>
+              <a:t> at 48 hours</a:t>
+            </a:r>
+          </a:p>
+          <a:p>
+            <a:endParaRPr lang="en-US" dirty="0"/>
+          </a:p>
+        </p:txBody>
+      </p:sp>
+    </p:spTree>
+    <p:extLst>
+      <p:ext uri="{BB962C8B-B14F-4D97-AF65-F5344CB8AC3E}">
+        <p14:creationId xmlns:p14="http://schemas.microsoft.com/office/powerpoint/2010/main" val="21377447"/>
+      </p:ext>
+    </p:extLst>
+  </p:cSld>
+  <p:clrMapOvr>
+    <a:masterClrMapping/>
+  </p:clrMapOvr>
+</p:sld>
+</file>
+
+<file path=ppt/slides/slide11.xml><?xml version="1.0" encoding="utf-8"?>
+<p:sld xmlns:a="http://schemas.openxmlformats.org/drawingml/2006/main" xmlns:r="http://schemas.openxmlformats.org/officeDocument/2006/relationships" xmlns:p="http://schemas.openxmlformats.org/presentationml/2006/main">
+  <p:cSld>
+    <p:spTree>
+      <p:nvGrpSpPr>
+        <p:cNvPr id="1" name=""/>
+        <p:cNvGrpSpPr/>
+        <p:nvPr/>
+      </p:nvGrpSpPr>
+      <p:grpSpPr>
+        <a:xfrm>
+          <a:off x="0" y="0"/>
+          <a:ext cx="0" cy="0"/>
+          <a:chOff x="0" y="0"/>
+          <a:chExt cx="0" cy="0"/>
+        </a:xfrm>
+      </p:grpSpPr>
       <p:pic>
         <p:nvPicPr>
           <p:cNvPr id="5" name="Picture 4">
@@ -13326,7 +13440,7 @@
 </p:sld>
 </file>
 
-<file path=ppt/slides/slide11.xml><?xml version="1.0" encoding="utf-8"?>
+<file path=ppt/slides/slide12.xml><?xml version="1.0" encoding="utf-8"?>
 <p:sld xmlns:a="http://schemas.openxmlformats.org/drawingml/2006/main" xmlns:r="http://schemas.openxmlformats.org/officeDocument/2006/relationships" xmlns:p="http://schemas.openxmlformats.org/presentationml/2006/main">
   <p:cSld>
     <p:spTree>
@@ -13449,7 +13563,7 @@
 </p:sld>
 </file>
 
-<file path=ppt/slides/slide12.xml><?xml version="1.0" encoding="utf-8"?>
+<file path=ppt/slides/slide13.xml><?xml version="1.0" encoding="utf-8"?>
 <p:sld xmlns:a="http://schemas.openxmlformats.org/drawingml/2006/main" xmlns:r="http://schemas.openxmlformats.org/officeDocument/2006/relationships" xmlns:p="http://schemas.openxmlformats.org/presentationml/2006/main">
   <p:cSld>
     <p:spTree>

</xml_diff>

<commit_message>
fig 6 clean script
</commit_message>
<xml_diff>
--- a/Figure_Overview.pptx
+++ b/Figure_Overview.pptx
@@ -13,11 +13,9 @@
     <p:sldId id="274" r:id="rId7"/>
     <p:sldId id="272" r:id="rId8"/>
     <p:sldId id="275" r:id="rId9"/>
-    <p:sldId id="278" r:id="rId10"/>
-    <p:sldId id="280" r:id="rId11"/>
-    <p:sldId id="279" r:id="rId12"/>
-    <p:sldId id="276" r:id="rId13"/>
-    <p:sldId id="277" r:id="rId14"/>
+    <p:sldId id="279" r:id="rId10"/>
+    <p:sldId id="276" r:id="rId11"/>
+    <p:sldId id="277" r:id="rId12"/>
   </p:sldIdLst>
   <p:sldSz cx="12192000" cy="6858000"/>
   <p:notesSz cx="6858000" cy="9144000"/>
@@ -9706,7 +9704,7 @@
           <a:p>
             <a:fld id="{701B5F52-0AED-4C15-A38B-FA5B006D1D86}" type="datetimeFigureOut">
               <a:rPr lang="en-US" smtClean="0"/>
-              <a:t>10/21/2017</a:t>
+              <a:t>10/23/2017</a:t>
             </a:fld>
             <a:endParaRPr lang="en-US"/>
           </a:p>
@@ -9904,7 +9902,7 @@
           <a:p>
             <a:fld id="{701B5F52-0AED-4C15-A38B-FA5B006D1D86}" type="datetimeFigureOut">
               <a:rPr lang="en-US" smtClean="0"/>
-              <a:t>10/21/2017</a:t>
+              <a:t>10/23/2017</a:t>
             </a:fld>
             <a:endParaRPr lang="en-US"/>
           </a:p>
@@ -10112,7 +10110,7 @@
           <a:p>
             <a:fld id="{701B5F52-0AED-4C15-A38B-FA5B006D1D86}" type="datetimeFigureOut">
               <a:rPr lang="en-US" smtClean="0"/>
-              <a:t>10/21/2017</a:t>
+              <a:t>10/23/2017</a:t>
             </a:fld>
             <a:endParaRPr lang="en-US"/>
           </a:p>
@@ -10310,7 +10308,7 @@
           <a:p>
             <a:fld id="{701B5F52-0AED-4C15-A38B-FA5B006D1D86}" type="datetimeFigureOut">
               <a:rPr lang="en-US" smtClean="0"/>
-              <a:t>10/21/2017</a:t>
+              <a:t>10/23/2017</a:t>
             </a:fld>
             <a:endParaRPr lang="en-US"/>
           </a:p>
@@ -10585,7 +10583,7 @@
           <a:p>
             <a:fld id="{701B5F52-0AED-4C15-A38B-FA5B006D1D86}" type="datetimeFigureOut">
               <a:rPr lang="en-US" smtClean="0"/>
-              <a:t>10/21/2017</a:t>
+              <a:t>10/23/2017</a:t>
             </a:fld>
             <a:endParaRPr lang="en-US"/>
           </a:p>
@@ -10850,7 +10848,7 @@
           <a:p>
             <a:fld id="{701B5F52-0AED-4C15-A38B-FA5B006D1D86}" type="datetimeFigureOut">
               <a:rPr lang="en-US" smtClean="0"/>
-              <a:t>10/21/2017</a:t>
+              <a:t>10/23/2017</a:t>
             </a:fld>
             <a:endParaRPr lang="en-US"/>
           </a:p>
@@ -11262,7 +11260,7 @@
           <a:p>
             <a:fld id="{701B5F52-0AED-4C15-A38B-FA5B006D1D86}" type="datetimeFigureOut">
               <a:rPr lang="en-US" smtClean="0"/>
-              <a:t>10/21/2017</a:t>
+              <a:t>10/23/2017</a:t>
             </a:fld>
             <a:endParaRPr lang="en-US"/>
           </a:p>
@@ -11403,7 +11401,7 @@
           <a:p>
             <a:fld id="{701B5F52-0AED-4C15-A38B-FA5B006D1D86}" type="datetimeFigureOut">
               <a:rPr lang="en-US" smtClean="0"/>
-              <a:t>10/21/2017</a:t>
+              <a:t>10/23/2017</a:t>
             </a:fld>
             <a:endParaRPr lang="en-US"/>
           </a:p>
@@ -11516,7 +11514,7 @@
           <a:p>
             <a:fld id="{701B5F52-0AED-4C15-A38B-FA5B006D1D86}" type="datetimeFigureOut">
               <a:rPr lang="en-US" smtClean="0"/>
-              <a:t>10/21/2017</a:t>
+              <a:t>10/23/2017</a:t>
             </a:fld>
             <a:endParaRPr lang="en-US"/>
           </a:p>
@@ -11827,7 +11825,7 @@
           <a:p>
             <a:fld id="{701B5F52-0AED-4C15-A38B-FA5B006D1D86}" type="datetimeFigureOut">
               <a:rPr lang="en-US" smtClean="0"/>
-              <a:t>10/21/2017</a:t>
+              <a:t>10/23/2017</a:t>
             </a:fld>
             <a:endParaRPr lang="en-US"/>
           </a:p>
@@ -12115,7 +12113,7 @@
           <a:p>
             <a:fld id="{701B5F52-0AED-4C15-A38B-FA5B006D1D86}" type="datetimeFigureOut">
               <a:rPr lang="en-US" smtClean="0"/>
-              <a:t>10/21/2017</a:t>
+              <a:t>10/23/2017</a:t>
             </a:fld>
             <a:endParaRPr lang="en-US"/>
           </a:p>
@@ -12356,7 +12354,7 @@
           <a:p>
             <a:fld id="{701B5F52-0AED-4C15-A38B-FA5B006D1D86}" type="datetimeFigureOut">
               <a:rPr lang="en-US" smtClean="0"/>
-              <a:t>10/21/2017</a:t>
+              <a:t>10/23/2017</a:t>
             </a:fld>
             <a:endParaRPr lang="en-US"/>
           </a:p>
@@ -13100,365 +13098,6 @@
       </p:grpSpPr>
       <p:sp>
         <p:nvSpPr>
-          <p:cNvPr id="3" name="Content Placeholder 2">
-            <a:extLst>
-              <a:ext uri="{FF2B5EF4-FFF2-40B4-BE49-F238E27FC236}">
-                <a16:creationId xmlns:a16="http://schemas.microsoft.com/office/drawing/2014/main" id="{0CADAE4C-6D55-4061-9893-6054AA467FC9}"/>
-              </a:ext>
-            </a:extLst>
-          </p:cNvPr>
-          <p:cNvSpPr>
-            <a:spLocks noGrp="1"/>
-          </p:cNvSpPr>
-          <p:nvPr>
-            <p:ph idx="1"/>
-          </p:nvPr>
-        </p:nvSpPr>
-        <p:spPr/>
-        <p:txBody>
-          <a:bodyPr/>
-          <a:lstStyle/>
-          <a:p>
-            <a:r>
-              <a:rPr lang="en-US" dirty="0"/>
-              <a:t>Main source of variation is initial proportion</a:t>
-            </a:r>
-          </a:p>
-          <a:p>
-            <a:r>
-              <a:rPr lang="en-US" dirty="0"/>
-              <a:t>Three parameters: initial proportion, number of cell types, difference in cell types</a:t>
-            </a:r>
-          </a:p>
-          <a:p>
-            <a:r>
-              <a:rPr lang="en-US" dirty="0"/>
-              <a:t>A – show variance with one type is small</a:t>
-            </a:r>
-          </a:p>
-          <a:p>
-            <a:r>
-              <a:rPr lang="en-US" dirty="0"/>
-              <a:t>B – show variance is large with two cell types and varying prop</a:t>
-            </a:r>
-          </a:p>
-          <a:p>
-            <a:r>
-              <a:rPr lang="en-US" dirty="0"/>
-              <a:t>C – show adding cell types does not increase this variance</a:t>
-            </a:r>
-          </a:p>
-          <a:p>
-            <a:r>
-              <a:rPr lang="en-US" dirty="0"/>
-              <a:t>D – show increasing variance with increase variance in prop</a:t>
-            </a:r>
-          </a:p>
-          <a:p>
-            <a:r>
-              <a:rPr lang="en-US" dirty="0"/>
-              <a:t>Each fig has 3 components: total over time, prop </a:t>
-            </a:r>
-            <a:r>
-              <a:rPr lang="en-US" dirty="0" err="1"/>
-              <a:t>dist</a:t>
-            </a:r>
-            <a:r>
-              <a:rPr lang="en-US" dirty="0"/>
-              <a:t>, total </a:t>
-            </a:r>
-            <a:r>
-              <a:rPr lang="en-US" dirty="0" err="1"/>
-              <a:t>dist</a:t>
-            </a:r>
-            <a:r>
-              <a:rPr lang="en-US" dirty="0"/>
-              <a:t> at 48 hours</a:t>
-            </a:r>
-          </a:p>
-          <a:p>
-            <a:endParaRPr lang="en-US" dirty="0"/>
-          </a:p>
-        </p:txBody>
-      </p:sp>
-    </p:spTree>
-    <p:extLst>
-      <p:ext uri="{BB962C8B-B14F-4D97-AF65-F5344CB8AC3E}">
-        <p14:creationId xmlns:p14="http://schemas.microsoft.com/office/powerpoint/2010/main" val="21377447"/>
-      </p:ext>
-    </p:extLst>
-  </p:cSld>
-  <p:clrMapOvr>
-    <a:masterClrMapping/>
-  </p:clrMapOvr>
-</p:sld>
-</file>
-
-<file path=ppt/slides/slide11.xml><?xml version="1.0" encoding="utf-8"?>
-<p:sld xmlns:a="http://schemas.openxmlformats.org/drawingml/2006/main" xmlns:r="http://schemas.openxmlformats.org/officeDocument/2006/relationships" xmlns:p="http://schemas.openxmlformats.org/presentationml/2006/main">
-  <p:cSld>
-    <p:spTree>
-      <p:nvGrpSpPr>
-        <p:cNvPr id="1" name=""/>
-        <p:cNvGrpSpPr/>
-        <p:nvPr/>
-      </p:nvGrpSpPr>
-      <p:grpSpPr>
-        <a:xfrm>
-          <a:off x="0" y="0"/>
-          <a:ext cx="0" cy="0"/>
-          <a:chOff x="0" y="0"/>
-          <a:chExt cx="0" cy="0"/>
-        </a:xfrm>
-      </p:grpSpPr>
-      <p:pic>
-        <p:nvPicPr>
-          <p:cNvPr id="5" name="Picture 4">
-            <a:extLst>
-              <a:ext uri="{FF2B5EF4-FFF2-40B4-BE49-F238E27FC236}">
-                <a16:creationId xmlns:a16="http://schemas.microsoft.com/office/drawing/2014/main" id="{FC788626-1049-4A02-B815-465A1DC4A447}"/>
-              </a:ext>
-            </a:extLst>
-          </p:cNvPr>
-          <p:cNvPicPr>
-            <a:picLocks noChangeAspect="1"/>
-          </p:cNvPicPr>
-          <p:nvPr/>
-        </p:nvPicPr>
-        <p:blipFill>
-          <a:blip r:embed="rId2">
-            <a:extLst>
-              <a:ext uri="{28A0092B-C50C-407E-A947-70E740481C1C}">
-                <a14:useLocalDpi xmlns:a14="http://schemas.microsoft.com/office/drawing/2010/main" val="0"/>
-              </a:ext>
-            </a:extLst>
-          </a:blip>
-          <a:stretch>
-            <a:fillRect/>
-          </a:stretch>
-        </p:blipFill>
-        <p:spPr>
-          <a:xfrm>
-            <a:off x="814872" y="471192"/>
-            <a:ext cx="2917374" cy="2917374"/>
-          </a:xfrm>
-          <a:prstGeom prst="rect">
-            <a:avLst/>
-          </a:prstGeom>
-        </p:spPr>
-      </p:pic>
-      <p:pic>
-        <p:nvPicPr>
-          <p:cNvPr id="7" name="Picture 6">
-            <a:extLst>
-              <a:ext uri="{FF2B5EF4-FFF2-40B4-BE49-F238E27FC236}">
-                <a16:creationId xmlns:a16="http://schemas.microsoft.com/office/drawing/2014/main" id="{3127C2DE-33E3-4644-A16E-BE31A2555840}"/>
-              </a:ext>
-            </a:extLst>
-          </p:cNvPr>
-          <p:cNvPicPr>
-            <a:picLocks noChangeAspect="1"/>
-          </p:cNvPicPr>
-          <p:nvPr/>
-        </p:nvPicPr>
-        <p:blipFill>
-          <a:blip r:embed="rId3">
-            <a:extLst>
-              <a:ext uri="{28A0092B-C50C-407E-A947-70E740481C1C}">
-                <a14:useLocalDpi xmlns:a14="http://schemas.microsoft.com/office/drawing/2010/main" val="0"/>
-              </a:ext>
-            </a:extLst>
-          </a:blip>
-          <a:stretch>
-            <a:fillRect/>
-          </a:stretch>
-        </p:blipFill>
-        <p:spPr>
-          <a:xfrm>
-            <a:off x="814872" y="3428995"/>
-            <a:ext cx="2917374" cy="2917374"/>
-          </a:xfrm>
-          <a:prstGeom prst="rect">
-            <a:avLst/>
-          </a:prstGeom>
-        </p:spPr>
-      </p:pic>
-      <p:pic>
-        <p:nvPicPr>
-          <p:cNvPr id="9" name="Picture 8">
-            <a:extLst>
-              <a:ext uri="{FF2B5EF4-FFF2-40B4-BE49-F238E27FC236}">
-                <a16:creationId xmlns:a16="http://schemas.microsoft.com/office/drawing/2014/main" id="{2E1804FF-1B8B-4F5D-811D-1F32ED8DC6EE}"/>
-              </a:ext>
-            </a:extLst>
-          </p:cNvPr>
-          <p:cNvPicPr>
-            <a:picLocks noChangeAspect="1"/>
-          </p:cNvPicPr>
-          <p:nvPr/>
-        </p:nvPicPr>
-        <p:blipFill>
-          <a:blip r:embed="rId4">
-            <a:extLst>
-              <a:ext uri="{28A0092B-C50C-407E-A947-70E740481C1C}">
-                <a14:useLocalDpi xmlns:a14="http://schemas.microsoft.com/office/drawing/2010/main" val="0"/>
-              </a:ext>
-            </a:extLst>
-          </a:blip>
-          <a:stretch>
-            <a:fillRect/>
-          </a:stretch>
-        </p:blipFill>
-        <p:spPr>
-          <a:xfrm>
-            <a:off x="3732246" y="471192"/>
-            <a:ext cx="2917374" cy="2917374"/>
-          </a:xfrm>
-          <a:prstGeom prst="rect">
-            <a:avLst/>
-          </a:prstGeom>
-        </p:spPr>
-      </p:pic>
-      <p:pic>
-        <p:nvPicPr>
-          <p:cNvPr id="11" name="Picture 10">
-            <a:extLst>
-              <a:ext uri="{FF2B5EF4-FFF2-40B4-BE49-F238E27FC236}">
-                <a16:creationId xmlns:a16="http://schemas.microsoft.com/office/drawing/2014/main" id="{95173844-8E16-4AD7-9F7F-7B448716AE38}"/>
-              </a:ext>
-            </a:extLst>
-          </p:cNvPr>
-          <p:cNvPicPr>
-            <a:picLocks noChangeAspect="1"/>
-          </p:cNvPicPr>
-          <p:nvPr/>
-        </p:nvPicPr>
-        <p:blipFill>
-          <a:blip r:embed="rId5">
-            <a:extLst>
-              <a:ext uri="{28A0092B-C50C-407E-A947-70E740481C1C}">
-                <a14:useLocalDpi xmlns:a14="http://schemas.microsoft.com/office/drawing/2010/main" val="0"/>
-              </a:ext>
-            </a:extLst>
-          </a:blip>
-          <a:stretch>
-            <a:fillRect/>
-          </a:stretch>
-        </p:blipFill>
-        <p:spPr>
-          <a:xfrm>
-            <a:off x="3937519" y="3428995"/>
-            <a:ext cx="2917374" cy="2917374"/>
-          </a:xfrm>
-          <a:prstGeom prst="rect">
-            <a:avLst/>
-          </a:prstGeom>
-        </p:spPr>
-      </p:pic>
-      <p:pic>
-        <p:nvPicPr>
-          <p:cNvPr id="13" name="Picture 12">
-            <a:extLst>
-              <a:ext uri="{FF2B5EF4-FFF2-40B4-BE49-F238E27FC236}">
-                <a16:creationId xmlns:a16="http://schemas.microsoft.com/office/drawing/2014/main" id="{9BA9335A-D2DE-41DB-AF19-8122F8FE0497}"/>
-              </a:ext>
-            </a:extLst>
-          </p:cNvPr>
-          <p:cNvPicPr>
-            <a:picLocks noChangeAspect="1"/>
-          </p:cNvPicPr>
-          <p:nvPr/>
-        </p:nvPicPr>
-        <p:blipFill>
-          <a:blip r:embed="rId6">
-            <a:extLst>
-              <a:ext uri="{28A0092B-C50C-407E-A947-70E740481C1C}">
-                <a14:useLocalDpi xmlns:a14="http://schemas.microsoft.com/office/drawing/2010/main" val="0"/>
-              </a:ext>
-            </a:extLst>
-          </a:blip>
-          <a:stretch>
-            <a:fillRect/>
-          </a:stretch>
-        </p:blipFill>
-        <p:spPr>
-          <a:xfrm>
-            <a:off x="7060165" y="511621"/>
-            <a:ext cx="2917374" cy="2917374"/>
-          </a:xfrm>
-          <a:prstGeom prst="rect">
-            <a:avLst/>
-          </a:prstGeom>
-        </p:spPr>
-      </p:pic>
-      <p:pic>
-        <p:nvPicPr>
-          <p:cNvPr id="15" name="Picture 14">
-            <a:extLst>
-              <a:ext uri="{FF2B5EF4-FFF2-40B4-BE49-F238E27FC236}">
-                <a16:creationId xmlns:a16="http://schemas.microsoft.com/office/drawing/2014/main" id="{1582A2A4-AB2F-416B-9C63-245E3FAC6B6B}"/>
-              </a:ext>
-            </a:extLst>
-          </p:cNvPr>
-          <p:cNvPicPr>
-            <a:picLocks noChangeAspect="1"/>
-          </p:cNvPicPr>
-          <p:nvPr/>
-        </p:nvPicPr>
-        <p:blipFill>
-          <a:blip r:embed="rId7">
-            <a:extLst>
-              <a:ext uri="{28A0092B-C50C-407E-A947-70E740481C1C}">
-                <a14:useLocalDpi xmlns:a14="http://schemas.microsoft.com/office/drawing/2010/main" val="0"/>
-              </a:ext>
-            </a:extLst>
-          </a:blip>
-          <a:stretch>
-            <a:fillRect/>
-          </a:stretch>
-        </p:blipFill>
-        <p:spPr>
-          <a:xfrm>
-            <a:off x="7060165" y="3388566"/>
-            <a:ext cx="2917374" cy="2917374"/>
-          </a:xfrm>
-          <a:prstGeom prst="rect">
-            <a:avLst/>
-          </a:prstGeom>
-        </p:spPr>
-      </p:pic>
-    </p:spTree>
-    <p:extLst>
-      <p:ext uri="{BB962C8B-B14F-4D97-AF65-F5344CB8AC3E}">
-        <p14:creationId xmlns:p14="http://schemas.microsoft.com/office/powerpoint/2010/main" val="3620757014"/>
-      </p:ext>
-    </p:extLst>
-  </p:cSld>
-  <p:clrMapOvr>
-    <a:masterClrMapping/>
-  </p:clrMapOvr>
-</p:sld>
-</file>
-
-<file path=ppt/slides/slide12.xml><?xml version="1.0" encoding="utf-8"?>
-<p:sld xmlns:a="http://schemas.openxmlformats.org/drawingml/2006/main" xmlns:r="http://schemas.openxmlformats.org/officeDocument/2006/relationships" xmlns:p="http://schemas.openxmlformats.org/presentationml/2006/main">
-  <p:cSld>
-    <p:spTree>
-      <p:nvGrpSpPr>
-        <p:cNvPr id="1" name=""/>
-        <p:cNvGrpSpPr/>
-        <p:nvPr/>
-      </p:nvGrpSpPr>
-      <p:grpSpPr>
-        <a:xfrm>
-          <a:off x="0" y="0"/>
-          <a:ext cx="0" cy="0"/>
-          <a:chOff x="0" y="0"/>
-          <a:chExt cx="0" cy="0"/>
-        </a:xfrm>
-      </p:grpSpPr>
-      <p:sp>
-        <p:nvSpPr>
           <p:cNvPr id="3" name="Subtitle 2">
             <a:extLst>
               <a:ext uri="{FF2B5EF4-FFF2-40B4-BE49-F238E27FC236}">
@@ -13563,7 +13202,7 @@
 </p:sld>
 </file>
 
-<file path=ppt/slides/slide13.xml><?xml version="1.0" encoding="utf-8"?>
+<file path=ppt/slides/slide11.xml><?xml version="1.0" encoding="utf-8"?>
 <p:sld xmlns:a="http://schemas.openxmlformats.org/drawingml/2006/main" xmlns:r="http://schemas.openxmlformats.org/officeDocument/2006/relationships" xmlns:p="http://schemas.openxmlformats.org/presentationml/2006/main">
   <p:cSld>
     <p:spTree>
@@ -14401,7 +14040,7 @@
         </p:nvSpPr>
         <p:spPr>
           <a:xfrm>
-            <a:off x="1299411" y="521953"/>
+            <a:off x="1175586" y="216200"/>
             <a:ext cx="9448800" cy="1178509"/>
           </a:xfrm>
         </p:spPr>
@@ -14770,10 +14409,10 @@
       </p:grpSpPr>
       <p:pic>
         <p:nvPicPr>
-          <p:cNvPr id="9" name="Picture 8">
+          <p:cNvPr id="3" name="Picture 2">
             <a:extLst>
               <a:ext uri="{FF2B5EF4-FFF2-40B4-BE49-F238E27FC236}">
-                <a16:creationId xmlns:a16="http://schemas.microsoft.com/office/drawing/2014/main" id="{7351E599-0572-462F-BC68-AF9AFABDE9F6}"/>
+                <a16:creationId xmlns:a16="http://schemas.microsoft.com/office/drawing/2014/main" id="{7C2588DA-91EA-448D-94B2-E0892C1BB38D}"/>
               </a:ext>
             </a:extLst>
           </p:cNvPr>
@@ -14796,8 +14435,8 @@
         </p:blipFill>
         <p:spPr>
           <a:xfrm>
-            <a:off x="404325" y="601823"/>
-            <a:ext cx="3474720" cy="3474720"/>
+            <a:off x="1240632" y="3257550"/>
+            <a:ext cx="2743200" cy="2743200"/>
           </a:xfrm>
           <a:prstGeom prst="rect">
             <a:avLst/>
@@ -14806,10 +14445,10 @@
       </p:pic>
       <p:pic>
         <p:nvPicPr>
-          <p:cNvPr id="16" name="Picture 15">
+          <p:cNvPr id="6" name="Picture 5">
             <a:extLst>
               <a:ext uri="{FF2B5EF4-FFF2-40B4-BE49-F238E27FC236}">
-                <a16:creationId xmlns:a16="http://schemas.microsoft.com/office/drawing/2014/main" id="{7F31A232-ECF5-4CA8-A527-9B976BBEF081}"/>
+                <a16:creationId xmlns:a16="http://schemas.microsoft.com/office/drawing/2014/main" id="{ED89D380-DB26-4C14-A56C-5C7CAF63E645}"/>
               </a:ext>
             </a:extLst>
           </p:cNvPr>
@@ -14832,8 +14471,8 @@
         </p:blipFill>
         <p:spPr>
           <a:xfrm>
-            <a:off x="4145903" y="601823"/>
-            <a:ext cx="3474720" cy="3474720"/>
+            <a:off x="4743450" y="466725"/>
+            <a:ext cx="2743200" cy="2743200"/>
           </a:xfrm>
           <a:prstGeom prst="rect">
             <a:avLst/>
@@ -14842,10 +14481,10 @@
       </p:pic>
       <p:pic>
         <p:nvPicPr>
-          <p:cNvPr id="18" name="Picture 17">
+          <p:cNvPr id="10" name="Picture 9">
             <a:extLst>
               <a:ext uri="{FF2B5EF4-FFF2-40B4-BE49-F238E27FC236}">
-                <a16:creationId xmlns:a16="http://schemas.microsoft.com/office/drawing/2014/main" id="{3F222579-7E5C-473C-A28B-34D3ABAF22F4}"/>
+                <a16:creationId xmlns:a16="http://schemas.microsoft.com/office/drawing/2014/main" id="{EBD7D6FC-2EBA-4AA7-90FD-C59A7B5BA8C0}"/>
               </a:ext>
             </a:extLst>
           </p:cNvPr>
@@ -14868,8 +14507,116 @@
         </p:blipFill>
         <p:spPr>
           <a:xfrm>
-            <a:off x="8046098" y="543039"/>
-            <a:ext cx="3474720" cy="3474720"/>
+            <a:off x="4737498" y="3209925"/>
+            <a:ext cx="2743200" cy="2743200"/>
+          </a:xfrm>
+          <a:prstGeom prst="rect">
+            <a:avLst/>
+          </a:prstGeom>
+        </p:spPr>
+      </p:pic>
+      <p:pic>
+        <p:nvPicPr>
+          <p:cNvPr id="14" name="Picture 13">
+            <a:extLst>
+              <a:ext uri="{FF2B5EF4-FFF2-40B4-BE49-F238E27FC236}">
+                <a16:creationId xmlns:a16="http://schemas.microsoft.com/office/drawing/2014/main" id="{1DC3FE1A-AB52-4F76-911B-6F7C3BCDCEE9}"/>
+              </a:ext>
+            </a:extLst>
+          </p:cNvPr>
+          <p:cNvPicPr>
+            <a:picLocks noChangeAspect="1"/>
+          </p:cNvPicPr>
+          <p:nvPr/>
+        </p:nvPicPr>
+        <p:blipFill>
+          <a:blip r:embed="rId5">
+            <a:extLst>
+              <a:ext uri="{28A0092B-C50C-407E-A947-70E740481C1C}">
+                <a14:useLocalDpi xmlns:a14="http://schemas.microsoft.com/office/drawing/2010/main" val="0"/>
+              </a:ext>
+            </a:extLst>
+          </a:blip>
+          <a:stretch>
+            <a:fillRect/>
+          </a:stretch>
+        </p:blipFill>
+        <p:spPr>
+          <a:xfrm>
+            <a:off x="8320089" y="466725"/>
+            <a:ext cx="2743200" cy="2743200"/>
+          </a:xfrm>
+          <a:prstGeom prst="rect">
+            <a:avLst/>
+          </a:prstGeom>
+        </p:spPr>
+      </p:pic>
+      <p:pic>
+        <p:nvPicPr>
+          <p:cNvPr id="17" name="Picture 16">
+            <a:extLst>
+              <a:ext uri="{FF2B5EF4-FFF2-40B4-BE49-F238E27FC236}">
+                <a16:creationId xmlns:a16="http://schemas.microsoft.com/office/drawing/2014/main" id="{7E586D59-A729-4228-B690-0DB253C4CC6A}"/>
+              </a:ext>
+            </a:extLst>
+          </p:cNvPr>
+          <p:cNvPicPr>
+            <a:picLocks noChangeAspect="1"/>
+          </p:cNvPicPr>
+          <p:nvPr/>
+        </p:nvPicPr>
+        <p:blipFill>
+          <a:blip r:embed="rId6">
+            <a:extLst>
+              <a:ext uri="{28A0092B-C50C-407E-A947-70E740481C1C}">
+                <a14:useLocalDpi xmlns:a14="http://schemas.microsoft.com/office/drawing/2010/main" val="0"/>
+              </a:ext>
+            </a:extLst>
+          </a:blip>
+          <a:stretch>
+            <a:fillRect/>
+          </a:stretch>
+        </p:blipFill>
+        <p:spPr>
+          <a:xfrm>
+            <a:off x="8320089" y="3257550"/>
+            <a:ext cx="2743200" cy="2743200"/>
+          </a:xfrm>
+          <a:prstGeom prst="rect">
+            <a:avLst/>
+          </a:prstGeom>
+        </p:spPr>
+      </p:pic>
+      <p:pic>
+        <p:nvPicPr>
+          <p:cNvPr id="19" name="Picture 18">
+            <a:extLst>
+              <a:ext uri="{FF2B5EF4-FFF2-40B4-BE49-F238E27FC236}">
+                <a16:creationId xmlns:a16="http://schemas.microsoft.com/office/drawing/2014/main" id="{37AAF1F3-6FD8-4861-B4C7-5EAB5C3A6BC9}"/>
+              </a:ext>
+            </a:extLst>
+          </p:cNvPr>
+          <p:cNvPicPr>
+            <a:picLocks noChangeAspect="1"/>
+          </p:cNvPicPr>
+          <p:nvPr/>
+        </p:nvPicPr>
+        <p:blipFill>
+          <a:blip r:embed="rId7">
+            <a:extLst>
+              <a:ext uri="{28A0092B-C50C-407E-A947-70E740481C1C}">
+                <a14:useLocalDpi xmlns:a14="http://schemas.microsoft.com/office/drawing/2010/main" val="0"/>
+              </a:ext>
+            </a:extLst>
+          </a:blip>
+          <a:stretch>
+            <a:fillRect/>
+          </a:stretch>
+        </p:blipFill>
+        <p:spPr>
+          <a:xfrm>
+            <a:off x="1240632" y="466725"/>
+            <a:ext cx="2743200" cy="2743200"/>
           </a:xfrm>
           <a:prstGeom prst="rect">
             <a:avLst/>
@@ -14879,7 +14626,7 @@
     </p:spTree>
     <p:extLst>
       <p:ext uri="{BB962C8B-B14F-4D97-AF65-F5344CB8AC3E}">
-        <p14:creationId xmlns:p14="http://schemas.microsoft.com/office/powerpoint/2010/main" val="2206480490"/>
+        <p14:creationId xmlns:p14="http://schemas.microsoft.com/office/powerpoint/2010/main" val="3620757014"/>
       </p:ext>
     </p:extLst>
   </p:cSld>

</xml_diff>

<commit_message>
updated figures with ggplot - still beed to finish fig 5
</commit_message>
<xml_diff>
--- a/Figure_Overview.pptx
+++ b/Figure_Overview.pptx
@@ -9704,7 +9704,7 @@
           <a:p>
             <a:fld id="{701B5F52-0AED-4C15-A38B-FA5B006D1D86}" type="datetimeFigureOut">
               <a:rPr lang="en-US" smtClean="0"/>
-              <a:t>11/8/2017</a:t>
+              <a:t>11/15/2017</a:t>
             </a:fld>
             <a:endParaRPr lang="en-US"/>
           </a:p>
@@ -9902,7 +9902,7 @@
           <a:p>
             <a:fld id="{701B5F52-0AED-4C15-A38B-FA5B006D1D86}" type="datetimeFigureOut">
               <a:rPr lang="en-US" smtClean="0"/>
-              <a:t>11/8/2017</a:t>
+              <a:t>11/15/2017</a:t>
             </a:fld>
             <a:endParaRPr lang="en-US"/>
           </a:p>
@@ -10110,7 +10110,7 @@
           <a:p>
             <a:fld id="{701B5F52-0AED-4C15-A38B-FA5B006D1D86}" type="datetimeFigureOut">
               <a:rPr lang="en-US" smtClean="0"/>
-              <a:t>11/8/2017</a:t>
+              <a:t>11/15/2017</a:t>
             </a:fld>
             <a:endParaRPr lang="en-US"/>
           </a:p>
@@ -10308,7 +10308,7 @@
           <a:p>
             <a:fld id="{701B5F52-0AED-4C15-A38B-FA5B006D1D86}" type="datetimeFigureOut">
               <a:rPr lang="en-US" smtClean="0"/>
-              <a:t>11/8/2017</a:t>
+              <a:t>11/15/2017</a:t>
             </a:fld>
             <a:endParaRPr lang="en-US"/>
           </a:p>
@@ -10583,7 +10583,7 @@
           <a:p>
             <a:fld id="{701B5F52-0AED-4C15-A38B-FA5B006D1D86}" type="datetimeFigureOut">
               <a:rPr lang="en-US" smtClean="0"/>
-              <a:t>11/8/2017</a:t>
+              <a:t>11/15/2017</a:t>
             </a:fld>
             <a:endParaRPr lang="en-US"/>
           </a:p>
@@ -10848,7 +10848,7 @@
           <a:p>
             <a:fld id="{701B5F52-0AED-4C15-A38B-FA5B006D1D86}" type="datetimeFigureOut">
               <a:rPr lang="en-US" smtClean="0"/>
-              <a:t>11/8/2017</a:t>
+              <a:t>11/15/2017</a:t>
             </a:fld>
             <a:endParaRPr lang="en-US"/>
           </a:p>
@@ -11260,7 +11260,7 @@
           <a:p>
             <a:fld id="{701B5F52-0AED-4C15-A38B-FA5B006D1D86}" type="datetimeFigureOut">
               <a:rPr lang="en-US" smtClean="0"/>
-              <a:t>11/8/2017</a:t>
+              <a:t>11/15/2017</a:t>
             </a:fld>
             <a:endParaRPr lang="en-US"/>
           </a:p>
@@ -11401,7 +11401,7 @@
           <a:p>
             <a:fld id="{701B5F52-0AED-4C15-A38B-FA5B006D1D86}" type="datetimeFigureOut">
               <a:rPr lang="en-US" smtClean="0"/>
-              <a:t>11/8/2017</a:t>
+              <a:t>11/15/2017</a:t>
             </a:fld>
             <a:endParaRPr lang="en-US"/>
           </a:p>
@@ -11514,7 +11514,7 @@
           <a:p>
             <a:fld id="{701B5F52-0AED-4C15-A38B-FA5B006D1D86}" type="datetimeFigureOut">
               <a:rPr lang="en-US" smtClean="0"/>
-              <a:t>11/8/2017</a:t>
+              <a:t>11/15/2017</a:t>
             </a:fld>
             <a:endParaRPr lang="en-US"/>
           </a:p>
@@ -11825,7 +11825,7 @@
           <a:p>
             <a:fld id="{701B5F52-0AED-4C15-A38B-FA5B006D1D86}" type="datetimeFigureOut">
               <a:rPr lang="en-US" smtClean="0"/>
-              <a:t>11/8/2017</a:t>
+              <a:t>11/15/2017</a:t>
             </a:fld>
             <a:endParaRPr lang="en-US"/>
           </a:p>
@@ -12113,7 +12113,7 @@
           <a:p>
             <a:fld id="{701B5F52-0AED-4C15-A38B-FA5B006D1D86}" type="datetimeFigureOut">
               <a:rPr lang="en-US" smtClean="0"/>
-              <a:t>11/8/2017</a:t>
+              <a:t>11/15/2017</a:t>
             </a:fld>
             <a:endParaRPr lang="en-US"/>
           </a:p>
@@ -12354,7 +12354,7 @@
           <a:p>
             <a:fld id="{701B5F52-0AED-4C15-A38B-FA5B006D1D86}" type="datetimeFigureOut">
               <a:rPr lang="en-US" smtClean="0"/>
-              <a:t>11/8/2017</a:t>
+              <a:t>11/15/2017</a:t>
             </a:fld>
             <a:endParaRPr lang="en-US"/>
           </a:p>
@@ -13260,6 +13260,42 @@
           </a:p>
         </p:txBody>
       </p:sp>
+      <p:pic>
+        <p:nvPicPr>
+          <p:cNvPr id="8" name="Picture 7">
+            <a:extLst>
+              <a:ext uri="{FF2B5EF4-FFF2-40B4-BE49-F238E27FC236}">
+                <a16:creationId xmlns:a16="http://schemas.microsoft.com/office/drawing/2014/main" id="{33D6B5DA-439A-4798-AAE1-DF86DE9CD057}"/>
+              </a:ext>
+            </a:extLst>
+          </p:cNvPr>
+          <p:cNvPicPr>
+            <a:picLocks noChangeAspect="1"/>
+          </p:cNvPicPr>
+          <p:nvPr/>
+        </p:nvPicPr>
+        <p:blipFill>
+          <a:blip r:embed="rId2">
+            <a:extLst>
+              <a:ext uri="{28A0092B-C50C-407E-A947-70E740481C1C}">
+                <a14:useLocalDpi xmlns:a14="http://schemas.microsoft.com/office/drawing/2010/main" val="0"/>
+              </a:ext>
+            </a:extLst>
+          </a:blip>
+          <a:stretch>
+            <a:fillRect/>
+          </a:stretch>
+        </p:blipFill>
+        <p:spPr>
+          <a:xfrm>
+            <a:off x="3030797" y="1018672"/>
+            <a:ext cx="5656003" cy="5656003"/>
+          </a:xfrm>
+          <a:prstGeom prst="rect">
+            <a:avLst/>
+          </a:prstGeom>
+        </p:spPr>
+      </p:pic>
     </p:spTree>
     <p:extLst>
       <p:ext uri="{BB962C8B-B14F-4D97-AF65-F5344CB8AC3E}">

</xml_diff>